<commit_message>
Updated R Cheat Sheet
</commit_message>
<xml_diff>
--- a/resources/MTH107-Rcheatsheet.pptx
+++ b/resources/MTH107-Rcheatsheet.pptx
@@ -1493,7 +1493,7 @@
           </a:ln>
           <a:extLst>
             <a:ext uri="{C572A759-6A51-4108-AA02-DFA0A04FC94B}">
-              <ma14:wrappingTextBoxFlag xmlns="" xmlns:ma14="http://schemas.microsoft.com/office/mac/drawingml/2011/main" val="1"/>
+              <ma14:wrappingTextBoxFlag xmlns:ma14="http://schemas.microsoft.com/office/mac/drawingml/2011/main" xmlns="" val="1"/>
             </a:ext>
           </a:extLst>
         </p:spPr>
@@ -1536,7 +1536,7 @@
           </a:ln>
           <a:extLst>
             <a:ext uri="{C572A759-6A51-4108-AA02-DFA0A04FC94B}">
-              <ma14:wrappingTextBoxFlag xmlns="" xmlns:ma14="http://schemas.microsoft.com/office/mac/drawingml/2011/main" val="1"/>
+              <ma14:wrappingTextBoxFlag xmlns:ma14="http://schemas.microsoft.com/office/mac/drawingml/2011/main" xmlns="" val="1"/>
             </a:ext>
           </a:extLst>
         </p:spPr>
@@ -2332,7 +2332,7 @@
             </a:ln>
             <a:extLst>
               <a:ext uri="{C572A759-6A51-4108-AA02-DFA0A04FC94B}">
-                <ma14:wrappingTextBoxFlag xmlns="" xmlns:ma14="http://schemas.microsoft.com/office/mac/drawingml/2011/main" val="1"/>
+                <ma14:wrappingTextBoxFlag xmlns:ma14="http://schemas.microsoft.com/office/mac/drawingml/2011/main" xmlns="" val="1"/>
               </a:ext>
             </a:extLst>
           </p:spPr>
@@ -3350,7 +3350,7 @@
           </a:ln>
           <a:extLst>
             <a:ext uri="{C572A759-6A51-4108-AA02-DFA0A04FC94B}">
-              <ma14:wrappingTextBoxFlag xmlns="" xmlns:ma14="http://schemas.microsoft.com/office/mac/drawingml/2011/main" val="1"/>
+              <ma14:wrappingTextBoxFlag xmlns:ma14="http://schemas.microsoft.com/office/mac/drawingml/2011/main" xmlns="" val="1"/>
             </a:ext>
           </a:extLst>
         </p:spPr>
@@ -3915,7 +3915,7 @@
             </a:ln>
             <a:extLst>
               <a:ext uri="{C572A759-6A51-4108-AA02-DFA0A04FC94B}">
-                <ma14:wrappingTextBoxFlag xmlns="" xmlns:ma14="http://schemas.microsoft.com/office/mac/drawingml/2011/main" val="1"/>
+                <ma14:wrappingTextBoxFlag xmlns:ma14="http://schemas.microsoft.com/office/mac/drawingml/2011/main" xmlns="" val="1"/>
               </a:ext>
             </a:extLst>
           </p:spPr>
@@ -3999,34 +3999,25 @@
             <a:p>
               <a:pPr algn="l" defTabSz="320174" rtl="0" latinLnBrk="1" hangingPunct="0"/>
               <a:r>
-                <a:rPr lang="en-US" sz="800" dirty="0" err="1">
+                <a:rPr lang="en-US" sz="800" dirty="0" smtClean="0">
                   <a:solidFill>
                     <a:srgbClr val="FF0000"/>
                   </a:solidFill>
                   <a:latin typeface="Source Sans Pro Semibold"/>
                 </a:rPr>
-                <a:t>corr</a:t>
+                <a:t>plot(</a:t>
               </a:r>
               <a:r>
-                <a:rPr lang="en-US" sz="800" dirty="0">
+                <a:rPr lang="en-US" sz="800" dirty="0" err="1" smtClean="0">
                   <a:solidFill>
                     <a:srgbClr val="FF0000"/>
                   </a:solidFill>
                   <a:latin typeface="Source Sans Pro Semibold"/>
                 </a:rPr>
-                <a:t>(~</a:t>
+                <a:t>qvarY~qvarX,data</a:t>
               </a:r>
               <a:r>
-                <a:rPr lang="en-US" sz="800" dirty="0" err="1">
-                  <a:solidFill>
-                    <a:srgbClr val="FF0000"/>
-                  </a:solidFill>
-                  <a:latin typeface="Source Sans Pro Semibold"/>
-                </a:rPr>
-                <a:t>qvarY+qvarX,data</a:t>
-              </a:r>
-              <a:r>
-                <a:rPr lang="en-US" sz="800" dirty="0">
+                <a:rPr lang="en-US" sz="800" dirty="0" smtClean="0">
                   <a:solidFill>
                     <a:srgbClr val="FF0000"/>
                   </a:solidFill>
@@ -4035,55 +4026,7 @@
                 <a:t>=</a:t>
               </a:r>
               <a:r>
-                <a:rPr lang="en-US" sz="800" dirty="0" err="1">
-                  <a:solidFill>
-                    <a:srgbClr val="FF0000"/>
-                  </a:solidFill>
-                  <a:latin typeface="Source Sans Pro Semibold"/>
-                </a:rPr>
-                <a:t>dfobj</a:t>
-              </a:r>
-              <a:r>
-                <a:rPr lang="en-US" sz="800" dirty="0">
-                  <a:solidFill>
-                    <a:srgbClr val="FF0000"/>
-                  </a:solidFill>
-                  <a:latin typeface="Source Sans Pro Semibold"/>
-                </a:rPr>
-                <a:t>)</a:t>
-              </a:r>
-            </a:p>
-            <a:p>
-              <a:pPr algn="l" defTabSz="320174" rtl="0" latinLnBrk="1" hangingPunct="0"/>
-              <a:r>
-                <a:rPr lang="en-US" sz="800" dirty="0">
-                  <a:solidFill>
-                    <a:srgbClr val="FF0000"/>
-                  </a:solidFill>
-                  <a:latin typeface="Source Sans Pro Semibold"/>
-                </a:rPr>
-                <a:t>plot(</a:t>
-              </a:r>
-              <a:r>
-                <a:rPr lang="en-US" sz="800" dirty="0" err="1">
-                  <a:solidFill>
-                    <a:srgbClr val="FF0000"/>
-                  </a:solidFill>
-                  <a:latin typeface="Source Sans Pro Semibold"/>
-                </a:rPr>
-                <a:t>qvarY~qvarX,data</a:t>
-              </a:r>
-              <a:r>
-                <a:rPr lang="en-US" sz="800" dirty="0">
-                  <a:solidFill>
-                    <a:srgbClr val="FF0000"/>
-                  </a:solidFill>
-                  <a:latin typeface="Source Sans Pro Semibold"/>
-                </a:rPr>
-                <a:t>=</a:t>
-              </a:r>
-              <a:r>
-                <a:rPr lang="en-US" sz="800" dirty="0" err="1">
+                <a:rPr lang="en-US" sz="800" dirty="0" err="1" smtClean="0">
                   <a:solidFill>
                     <a:srgbClr val="FF0000"/>
                   </a:solidFill>
@@ -4111,6 +4054,15 @@
                   <a:latin typeface="Source Sans Pro Semibold"/>
                 </a:rPr>
                 <a:t>      </a:t>
+              </a:r>
+              <a:r>
+                <a:rPr lang="en-US" sz="800" dirty="0" smtClean="0">
+                  <a:solidFill>
+                    <a:srgbClr val="FF0000"/>
+                  </a:solidFill>
+                  <a:latin typeface="Source Sans Pro Semibold"/>
+                </a:rPr>
+                <a:t> </a:t>
               </a:r>
               <a:r>
                 <a:rPr lang="en-US" sz="800" dirty="0" err="1" smtClean="0">
@@ -4209,8 +4161,80 @@
                   </a:solidFill>
                   <a:latin typeface="Source Sans Pro Semibold"/>
                 </a:rPr>
-                <a:t>label”)</a:t>
+                <a:t>label</a:t>
               </a:r>
+              <a:r>
+                <a:rPr lang="en-US" sz="800" dirty="0" smtClean="0">
+                  <a:solidFill>
+                    <a:srgbClr val="FF0000"/>
+                  </a:solidFill>
+                  <a:latin typeface="Source Sans Pro Semibold"/>
+                </a:rPr>
+                <a:t>”)</a:t>
+              </a:r>
+            </a:p>
+            <a:p>
+              <a:pPr algn="l" defTabSz="320174" rtl="0" latinLnBrk="1" hangingPunct="0"/>
+              <a:r>
+                <a:rPr lang="en-US" sz="800" dirty="0" err="1">
+                  <a:solidFill>
+                    <a:srgbClr val="FF0000"/>
+                  </a:solidFill>
+                  <a:latin typeface="Source Sans Pro Semibold"/>
+                </a:rPr>
+                <a:t>corr</a:t>
+              </a:r>
+              <a:r>
+                <a:rPr lang="en-US" sz="800" dirty="0">
+                  <a:solidFill>
+                    <a:srgbClr val="FF0000"/>
+                  </a:solidFill>
+                  <a:latin typeface="Source Sans Pro Semibold"/>
+                </a:rPr>
+                <a:t>(~</a:t>
+              </a:r>
+              <a:r>
+                <a:rPr lang="en-US" sz="800" dirty="0" err="1">
+                  <a:solidFill>
+                    <a:srgbClr val="FF0000"/>
+                  </a:solidFill>
+                  <a:latin typeface="Source Sans Pro Semibold"/>
+                </a:rPr>
+                <a:t>qvarY+qvarX,data</a:t>
+              </a:r>
+              <a:r>
+                <a:rPr lang="en-US" sz="800" dirty="0">
+                  <a:solidFill>
+                    <a:srgbClr val="FF0000"/>
+                  </a:solidFill>
+                  <a:latin typeface="Source Sans Pro Semibold"/>
+                </a:rPr>
+                <a:t>=</a:t>
+              </a:r>
+              <a:r>
+                <a:rPr lang="en-US" sz="800" dirty="0" err="1">
+                  <a:solidFill>
+                    <a:srgbClr val="FF0000"/>
+                  </a:solidFill>
+                  <a:latin typeface="Source Sans Pro Semibold"/>
+                </a:rPr>
+                <a:t>dfobj</a:t>
+              </a:r>
+              <a:r>
+                <a:rPr lang="en-US" sz="800" dirty="0" smtClean="0">
+                  <a:solidFill>
+                    <a:srgbClr val="FF0000"/>
+                  </a:solidFill>
+                  <a:latin typeface="Source Sans Pro Semibold"/>
+                </a:rPr>
+                <a:t>)</a:t>
+              </a:r>
+              <a:endParaRPr lang="en-US" sz="800" dirty="0">
+                <a:solidFill>
+                  <a:srgbClr val="FF0000"/>
+                </a:solidFill>
+                <a:latin typeface="Source Sans Pro Semibold"/>
+              </a:endParaRPr>
             </a:p>
           </p:txBody>
         </p:sp>
@@ -4635,13 +4659,13 @@
               <a:buChar char="•"/>
             </a:pPr>
             <a:r>
-              <a:rPr lang="en-US" sz="800" dirty="0" err="1">
-                <a:solidFill>
-                  <a:srgbClr val="FF0000"/>
-                </a:solidFill>
-                <a:latin typeface="Source Sans Pro Semibold"/>
-              </a:rPr>
-              <a:t>lower.tail</a:t>
+              <a:rPr lang="en-US" sz="800" dirty="0" smtClean="0">
+                <a:solidFill>
+                  <a:srgbClr val="FF0000"/>
+                </a:solidFill>
+                <a:latin typeface="Source Sans Pro Semibold"/>
+              </a:rPr>
+              <a:t>type</a:t>
             </a:r>
             <a:r>
               <a:rPr lang="en-US" sz="800" dirty="0">
@@ -4650,19 +4674,19 @@
                 </a:solidFill>
                 <a:latin typeface="Source Sans Pro Semibold"/>
               </a:rPr>
-              <a:t>=FALSE</a:t>
-            </a:r>
-            <a:r>
-              <a:rPr lang="en-US" sz="800" b="1" dirty="0">
-                <a:latin typeface="Source Sans Pro Light"/>
-              </a:rPr>
-              <a:t> </a:t>
+              <a:t>=”q” </a:t>
             </a:r>
             <a:r>
               <a:rPr lang="en-US" sz="800" dirty="0">
                 <a:latin typeface="Source Sans Pro Light"/>
               </a:rPr>
-              <a:t>is included for “right-of” calculations</a:t>
+              <a:t>is included for reverse </a:t>
+            </a:r>
+            <a:r>
+              <a:rPr lang="en-US" sz="800" dirty="0" smtClean="0">
+                <a:latin typeface="Source Sans Pro Light"/>
+              </a:rPr>
+              <a:t>calculations</a:t>
             </a:r>
           </a:p>
           <a:p>
@@ -4674,20 +4698,44 @@
               <a:buChar char="•"/>
             </a:pPr>
             <a:r>
+              <a:rPr lang="en-US" sz="800" dirty="0" err="1">
+                <a:solidFill>
+                  <a:srgbClr val="FF0000"/>
+                </a:solidFill>
+                <a:latin typeface="Source Sans Pro Semibold"/>
+              </a:rPr>
+              <a:t>lower.tail</a:t>
+            </a:r>
+            <a:r>
               <a:rPr lang="en-US" sz="800" dirty="0">
                 <a:solidFill>
                   <a:srgbClr val="FF0000"/>
                 </a:solidFill>
                 <a:latin typeface="Source Sans Pro Semibold"/>
               </a:rPr>
-              <a:t>type=”q” </a:t>
+              <a:t>=FALSE</a:t>
+            </a:r>
+            <a:r>
+              <a:rPr lang="en-US" sz="800" b="1" dirty="0">
+                <a:latin typeface="Source Sans Pro Light"/>
+              </a:rPr>
+              <a:t> </a:t>
             </a:r>
             <a:r>
               <a:rPr lang="en-US" sz="800" dirty="0">
                 <a:latin typeface="Source Sans Pro Light"/>
               </a:rPr>
-              <a:t>is included for reverse calculations</a:t>
-            </a:r>
+              <a:t>is included for “right-of” </a:t>
+            </a:r>
+            <a:r>
+              <a:rPr lang="en-US" sz="800" dirty="0" smtClean="0">
+                <a:latin typeface="Source Sans Pro Light"/>
+              </a:rPr>
+              <a:t>calculations</a:t>
+            </a:r>
+            <a:endParaRPr lang="en-US" sz="800" dirty="0">
+              <a:latin typeface="Source Sans Pro Light"/>
+            </a:endParaRPr>
           </a:p>
           <a:p>
             <a:pPr marL="62643" indent="-60903" algn="l">
@@ -4767,7 +4815,7 @@
           </a:ln>
           <a:extLst>
             <a:ext uri="{C572A759-6A51-4108-AA02-DFA0A04FC94B}">
-              <ma14:wrappingTextBoxFlag xmlns="" xmlns:ma14="http://schemas.microsoft.com/office/mac/drawingml/2011/main" val="1"/>
+              <ma14:wrappingTextBoxFlag xmlns:ma14="http://schemas.microsoft.com/office/mac/drawingml/2011/main" xmlns="" val="1"/>
             </a:ext>
           </a:extLst>
         </p:spPr>
@@ -4935,7 +4983,25 @@
               <a:t>           </a:t>
             </a:r>
             <a:r>
-              <a:rPr lang="en-US" sz="800" dirty="0" err="1">
+              <a:rPr lang="en-US" sz="800" dirty="0">
+                <a:solidFill>
+                  <a:srgbClr val="FF0000"/>
+                </a:solidFill>
+                <a:latin typeface="Source Sans Pro Semibold"/>
+              </a:rPr>
+              <a:t>type=“q</a:t>
+            </a:r>
+            <a:r>
+              <a:rPr lang="en-US" sz="800" dirty="0" smtClean="0">
+                <a:solidFill>
+                  <a:srgbClr val="FF0000"/>
+                </a:solidFill>
+                <a:latin typeface="Source Sans Pro Semibold"/>
+              </a:rPr>
+              <a:t>”,</a:t>
+            </a:r>
+            <a:r>
+              <a:rPr lang="en-US" sz="800" dirty="0" err="1" smtClean="0">
                 <a:solidFill>
                   <a:srgbClr val="FF0000"/>
                 </a:solidFill>
@@ -4944,32 +5010,29 @@
               <a:t>lower.tail</a:t>
             </a:r>
             <a:r>
-              <a:rPr lang="en-US" sz="800" dirty="0">
-                <a:solidFill>
-                  <a:srgbClr val="FF0000"/>
-                </a:solidFill>
-                <a:latin typeface="Source Sans Pro Semibold"/>
-              </a:rPr>
-              <a:t>=</a:t>
-            </a:r>
-            <a:r>
-              <a:rPr lang="en-US" sz="800" dirty="0" err="1">
-                <a:solidFill>
-                  <a:srgbClr val="FF0000"/>
-                </a:solidFill>
-                <a:latin typeface="Source Sans Pro Semibold"/>
-              </a:rPr>
-              <a:t>FALSE,type</a:t>
-            </a:r>
-            <a:r>
-              <a:rPr lang="en-US" sz="800" dirty="0">
-                <a:solidFill>
-                  <a:srgbClr val="FF0000"/>
-                </a:solidFill>
-                <a:latin typeface="Source Sans Pro Semibold"/>
-              </a:rPr>
-              <a:t>=“q”)</a:t>
-            </a:r>
+              <a:rPr lang="en-US" sz="800" dirty="0" smtClean="0">
+                <a:solidFill>
+                  <a:srgbClr val="FF0000"/>
+                </a:solidFill>
+                <a:latin typeface="Source Sans Pro Semibold"/>
+              </a:rPr>
+              <a:t>=FALSE</a:t>
+            </a:r>
+            <a:r>
+              <a:rPr lang="en-US" sz="800" dirty="0" smtClean="0">
+                <a:solidFill>
+                  <a:srgbClr val="FF0000"/>
+                </a:solidFill>
+                <a:latin typeface="Source Sans Pro Semibold"/>
+              </a:rPr>
+              <a:t>)</a:t>
+            </a:r>
+            <a:endParaRPr lang="en-US" sz="800" dirty="0">
+              <a:solidFill>
+                <a:srgbClr val="FF0000"/>
+              </a:solidFill>
+              <a:latin typeface="Source Sans Pro Semibold"/>
+            </a:endParaRPr>
           </a:p>
         </p:txBody>
       </p:sp>
@@ -5434,7 +5497,7 @@
             </a:ln>
             <a:extLst>
               <a:ext uri="{C572A759-6A51-4108-AA02-DFA0A04FC94B}">
-                <ma14:wrappingTextBoxFlag xmlns="" xmlns:ma14="http://schemas.microsoft.com/office/mac/drawingml/2011/main" val="1"/>
+                <ma14:wrappingTextBoxFlag xmlns:ma14="http://schemas.microsoft.com/office/mac/drawingml/2011/main" xmlns="" val="1"/>
               </a:ext>
             </a:extLst>
           </p:spPr>
@@ -5518,61 +5581,7 @@
             <a:p>
               <a:pPr algn="l" defTabSz="320174" rtl="0" latinLnBrk="1" hangingPunct="0"/>
               <a:r>
-                <a:rPr lang="en-US" sz="800" dirty="0">
-                  <a:solidFill>
-                    <a:srgbClr val="FF0000"/>
-                  </a:solidFill>
-                  <a:latin typeface="Source Sans Pro Semibold"/>
-                </a:rPr>
-                <a:t>Summarize(~</a:t>
-              </a:r>
-              <a:r>
-                <a:rPr lang="en-US" sz="800" dirty="0" err="1">
-                  <a:solidFill>
-                    <a:srgbClr val="FF0000"/>
-                  </a:solidFill>
-                  <a:latin typeface="Source Sans Pro Semibold"/>
-                </a:rPr>
-                <a:t>qvar,data</a:t>
-              </a:r>
-              <a:r>
-                <a:rPr lang="en-US" sz="800" dirty="0">
-                  <a:solidFill>
-                    <a:srgbClr val="FF0000"/>
-                  </a:solidFill>
-                  <a:latin typeface="Source Sans Pro Semibold"/>
-                </a:rPr>
-                <a:t>=</a:t>
-              </a:r>
-              <a:r>
-                <a:rPr lang="en-US" sz="800" dirty="0" err="1">
-                  <a:solidFill>
-                    <a:srgbClr val="FF0000"/>
-                  </a:solidFill>
-                  <a:latin typeface="Source Sans Pro Semibold"/>
-                </a:rPr>
-                <a:t>dfobj,digits</a:t>
-              </a:r>
-              <a:r>
-                <a:rPr lang="en-US" sz="800" dirty="0" smtClean="0">
-                  <a:solidFill>
-                    <a:srgbClr val="FF0000"/>
-                  </a:solidFill>
-                  <a:latin typeface="Source Sans Pro Semibold"/>
-                </a:rPr>
-                <a:t>=#)</a:t>
-              </a:r>
-              <a:endParaRPr lang="en-US" sz="800" dirty="0">
-                <a:solidFill>
-                  <a:srgbClr val="FF0000"/>
-                </a:solidFill>
-                <a:latin typeface="Source Sans Pro Semibold"/>
-              </a:endParaRPr>
-            </a:p>
-            <a:p>
-              <a:pPr algn="l" defTabSz="320174" rtl="0" latinLnBrk="1" hangingPunct="0"/>
-              <a:r>
-                <a:rPr lang="en-US" sz="800" dirty="0" err="1">
+                <a:rPr lang="en-US" sz="800" dirty="0" err="1" smtClean="0">
                   <a:solidFill>
                     <a:srgbClr val="FF0000"/>
                   </a:solidFill>
@@ -5650,8 +5659,71 @@
                   </a:solidFill>
                   <a:latin typeface="Source Sans Pro Semibold"/>
                 </a:rPr>
-                <a:t>label”)</a:t>
+                <a:t>label</a:t>
               </a:r>
+              <a:r>
+                <a:rPr lang="en-US" sz="800" dirty="0" smtClean="0">
+                  <a:solidFill>
+                    <a:srgbClr val="FF0000"/>
+                  </a:solidFill>
+                  <a:latin typeface="Source Sans Pro Semibold"/>
+                </a:rPr>
+                <a:t>”)</a:t>
+              </a:r>
+            </a:p>
+            <a:p>
+              <a:pPr algn="l" defTabSz="320174" rtl="0" latinLnBrk="1" hangingPunct="0"/>
+              <a:r>
+                <a:rPr lang="en-US" sz="800" dirty="0">
+                  <a:solidFill>
+                    <a:srgbClr val="FF0000"/>
+                  </a:solidFill>
+                  <a:latin typeface="Source Sans Pro Semibold"/>
+                </a:rPr>
+                <a:t>Summarize(~</a:t>
+              </a:r>
+              <a:r>
+                <a:rPr lang="en-US" sz="800" dirty="0" err="1">
+                  <a:solidFill>
+                    <a:srgbClr val="FF0000"/>
+                  </a:solidFill>
+                  <a:latin typeface="Source Sans Pro Semibold"/>
+                </a:rPr>
+                <a:t>qvar,data</a:t>
+              </a:r>
+              <a:r>
+                <a:rPr lang="en-US" sz="800" dirty="0">
+                  <a:solidFill>
+                    <a:srgbClr val="FF0000"/>
+                  </a:solidFill>
+                  <a:latin typeface="Source Sans Pro Semibold"/>
+                </a:rPr>
+                <a:t>=</a:t>
+              </a:r>
+              <a:r>
+                <a:rPr lang="en-US" sz="800" dirty="0" err="1">
+                  <a:solidFill>
+                    <a:srgbClr val="FF0000"/>
+                  </a:solidFill>
+                  <a:latin typeface="Source Sans Pro Semibold"/>
+                </a:rPr>
+                <a:t>dfobj,digits</a:t>
+              </a:r>
+              <a:r>
+                <a:rPr lang="en-US" sz="800" dirty="0" smtClean="0">
+                  <a:solidFill>
+                    <a:srgbClr val="FF0000"/>
+                  </a:solidFill>
+                  <a:latin typeface="Source Sans Pro Semibold"/>
+                </a:rPr>
+                <a:t>=#)</a:t>
+              </a:r>
+              <a:endParaRPr lang="en-US" sz="800" dirty="0">
+                <a:solidFill>
+                  <a:srgbClr val="FF0000"/>
+                </a:solidFill>
+                <a:latin typeface="Source Sans Pro Semibold"/>
+              </a:endParaRPr>
             </a:p>
           </p:txBody>
         </p:sp>
@@ -5947,60 +6019,6 @@
             <a:p>
               <a:pPr algn="l" defTabSz="320174" rtl="0" latinLnBrk="1" hangingPunct="0"/>
               <a:r>
-                <a:rPr lang="en-US" sz="800" dirty="0">
-                  <a:solidFill>
-                    <a:srgbClr val="FF0000"/>
-                  </a:solidFill>
-                  <a:latin typeface="Source Sans Pro Semibold"/>
-                </a:rPr>
-                <a:t>Summarize(</a:t>
-              </a:r>
-              <a:r>
-                <a:rPr lang="en-US" sz="800" dirty="0" err="1">
-                  <a:solidFill>
-                    <a:srgbClr val="FF0000"/>
-                  </a:solidFill>
-                  <a:latin typeface="Source Sans Pro Semibold"/>
-                </a:rPr>
-                <a:t>qvar~fvar,data</a:t>
-              </a:r>
-              <a:r>
-                <a:rPr lang="en-US" sz="800" dirty="0">
-                  <a:solidFill>
-                    <a:srgbClr val="FF0000"/>
-                  </a:solidFill>
-                  <a:latin typeface="Source Sans Pro Semibold"/>
-                </a:rPr>
-                <a:t>=</a:t>
-              </a:r>
-              <a:r>
-                <a:rPr lang="en-US" sz="800" dirty="0" err="1">
-                  <a:solidFill>
-                    <a:srgbClr val="FF0000"/>
-                  </a:solidFill>
-                  <a:latin typeface="Source Sans Pro Semibold"/>
-                </a:rPr>
-                <a:t>dfobj,digits</a:t>
-              </a:r>
-              <a:r>
-                <a:rPr lang="en-US" sz="800" dirty="0" smtClean="0">
-                  <a:solidFill>
-                    <a:srgbClr val="FF0000"/>
-                  </a:solidFill>
-                  <a:latin typeface="Source Sans Pro Semibold"/>
-                </a:rPr>
-                <a:t>=#)</a:t>
-              </a:r>
-              <a:endParaRPr lang="en-US" sz="800" dirty="0">
-                <a:solidFill>
-                  <a:srgbClr val="FF0000"/>
-                </a:solidFill>
-                <a:latin typeface="Source Sans Pro Semibold"/>
-              </a:endParaRPr>
-            </a:p>
-            <a:p>
-              <a:pPr algn="l" defTabSz="320174" rtl="0" latinLnBrk="1" hangingPunct="0"/>
-              <a:r>
                 <a:rPr lang="en-US" sz="800" dirty="0" err="1" smtClean="0">
                   <a:solidFill>
                     <a:srgbClr val="FF0000"/>
@@ -6079,8 +6097,71 @@
                   </a:solidFill>
                   <a:latin typeface="Source Sans Pro Semibold"/>
                 </a:rPr>
-                <a:t>label”)</a:t>
+                <a:t>label</a:t>
               </a:r>
+              <a:r>
+                <a:rPr lang="en-US" sz="800" dirty="0" smtClean="0">
+                  <a:solidFill>
+                    <a:srgbClr val="FF0000"/>
+                  </a:solidFill>
+                  <a:latin typeface="Source Sans Pro Semibold"/>
+                </a:rPr>
+                <a:t>”)</a:t>
+              </a:r>
+            </a:p>
+            <a:p>
+              <a:pPr algn="l" defTabSz="320174" rtl="0" latinLnBrk="1" hangingPunct="0"/>
+              <a:r>
+                <a:rPr lang="en-US" sz="800" dirty="0">
+                  <a:solidFill>
+                    <a:srgbClr val="FF0000"/>
+                  </a:solidFill>
+                  <a:latin typeface="Source Sans Pro Semibold"/>
+                </a:rPr>
+                <a:t>Summarize(</a:t>
+              </a:r>
+              <a:r>
+                <a:rPr lang="en-US" sz="800" dirty="0" err="1">
+                  <a:solidFill>
+                    <a:srgbClr val="FF0000"/>
+                  </a:solidFill>
+                  <a:latin typeface="Source Sans Pro Semibold"/>
+                </a:rPr>
+                <a:t>qvar~fvar,data</a:t>
+              </a:r>
+              <a:r>
+                <a:rPr lang="en-US" sz="800" dirty="0">
+                  <a:solidFill>
+                    <a:srgbClr val="FF0000"/>
+                  </a:solidFill>
+                  <a:latin typeface="Source Sans Pro Semibold"/>
+                </a:rPr>
+                <a:t>=</a:t>
+              </a:r>
+              <a:r>
+                <a:rPr lang="en-US" sz="800" dirty="0" err="1">
+                  <a:solidFill>
+                    <a:srgbClr val="FF0000"/>
+                  </a:solidFill>
+                  <a:latin typeface="Source Sans Pro Semibold"/>
+                </a:rPr>
+                <a:t>dfobj,digits</a:t>
+              </a:r>
+              <a:r>
+                <a:rPr lang="en-US" sz="800" dirty="0" smtClean="0">
+                  <a:solidFill>
+                    <a:srgbClr val="FF0000"/>
+                  </a:solidFill>
+                  <a:latin typeface="Source Sans Pro Semibold"/>
+                </a:rPr>
+                <a:t>=#)</a:t>
+              </a:r>
+              <a:endParaRPr lang="en-US" sz="800" dirty="0">
+                <a:solidFill>
+                  <a:srgbClr val="FF0000"/>
+                </a:solidFill>
+                <a:latin typeface="Source Sans Pro Semibold"/>
+              </a:endParaRPr>
             </a:p>
           </p:txBody>
         </p:sp>
@@ -6409,7 +6490,7 @@
           </a:ln>
           <a:extLst>
             <a:ext uri="{C572A759-6A51-4108-AA02-DFA0A04FC94B}">
-              <ma14:wrappingTextBoxFlag xmlns="" xmlns:ma14="http://schemas.microsoft.com/office/mac/drawingml/2011/main" val="1"/>
+              <ma14:wrappingTextBoxFlag xmlns:ma14="http://schemas.microsoft.com/office/mac/drawingml/2011/main" xmlns="" val="1"/>
             </a:ext>
           </a:extLst>
         </p:spPr>
@@ -7454,7 +7535,7 @@
           </a:ln>
           <a:extLst>
             <a:ext uri="{C572A759-6A51-4108-AA02-DFA0A04FC94B}">
-              <ma14:wrappingTextBoxFlag xmlns="" xmlns:ma14="http://schemas.microsoft.com/office/mac/drawingml/2011/main" val="1"/>
+              <ma14:wrappingTextBoxFlag xmlns:ma14="http://schemas.microsoft.com/office/mac/drawingml/2011/main" xmlns="" val="1"/>
             </a:ext>
           </a:extLst>
         </p:spPr>
@@ -8285,7 +8366,7 @@
           </a:ln>
           <a:extLst>
             <a:ext uri="{C572A759-6A51-4108-AA02-DFA0A04FC94B}">
-              <ma14:wrappingTextBoxFlag xmlns="" xmlns:ma14="http://schemas.microsoft.com/office/mac/drawingml/2011/main" val="1"/>
+              <ma14:wrappingTextBoxFlag xmlns:ma14="http://schemas.microsoft.com/office/mac/drawingml/2011/main" xmlns="" val="1"/>
             </a:ext>
           </a:extLst>
         </p:spPr>
@@ -8806,7 +8887,7 @@
           </a:ln>
           <a:extLst>
             <a:ext uri="{C572A759-6A51-4108-AA02-DFA0A04FC94B}">
-              <ma14:wrappingTextBoxFlag xmlns="" xmlns:ma14="http://schemas.microsoft.com/office/mac/drawingml/2011/main" val="1"/>
+              <ma14:wrappingTextBoxFlag xmlns:ma14="http://schemas.microsoft.com/office/mac/drawingml/2011/main" xmlns="" val="1"/>
             </a:ext>
           </a:extLst>
         </p:spPr>
@@ -8872,7 +8953,7 @@
           </a:ln>
           <a:extLst>
             <a:ext uri="{C572A759-6A51-4108-AA02-DFA0A04FC94B}">
-              <ma14:wrappingTextBoxFlag xmlns="" xmlns:ma14="http://schemas.microsoft.com/office/mac/drawingml/2011/main" val="1"/>
+              <ma14:wrappingTextBoxFlag xmlns:ma14="http://schemas.microsoft.com/office/mac/drawingml/2011/main" xmlns="" val="1"/>
             </a:ext>
           </a:extLst>
         </p:spPr>
@@ -8938,7 +9019,7 @@
           </a:ln>
           <a:extLst>
             <a:ext uri="{C572A759-6A51-4108-AA02-DFA0A04FC94B}">
-              <ma14:wrappingTextBoxFlag xmlns="" xmlns:ma14="http://schemas.microsoft.com/office/mac/drawingml/2011/main" val="1"/>
+              <ma14:wrappingTextBoxFlag xmlns:ma14="http://schemas.microsoft.com/office/mac/drawingml/2011/main" xmlns="" val="1"/>
             </a:ext>
           </a:extLst>
         </p:spPr>
@@ -9229,7 +9310,7 @@
           </a:ln>
           <a:extLst>
             <a:ext uri="{C572A759-6A51-4108-AA02-DFA0A04FC94B}">
-              <ma14:wrappingTextBoxFlag xmlns="" xmlns:ma14="http://schemas.microsoft.com/office/mac/drawingml/2011/main" val="1"/>
+              <ma14:wrappingTextBoxFlag xmlns:ma14="http://schemas.microsoft.com/office/mac/drawingml/2011/main" xmlns="" val="1"/>
             </a:ext>
           </a:extLst>
         </p:spPr>
@@ -9295,7 +9376,7 @@
           </a:ln>
           <a:extLst>
             <a:ext uri="{C572A759-6A51-4108-AA02-DFA0A04FC94B}">
-              <ma14:wrappingTextBoxFlag xmlns="" xmlns:ma14="http://schemas.microsoft.com/office/mac/drawingml/2011/main" val="1"/>
+              <ma14:wrappingTextBoxFlag xmlns:ma14="http://schemas.microsoft.com/office/mac/drawingml/2011/main" xmlns="" val="1"/>
             </a:ext>
           </a:extLst>
         </p:spPr>
@@ -9401,8 +9482,8 @@
         </p:nvSpPr>
         <p:spPr>
           <a:xfrm>
-            <a:off x="7387967" y="471082"/>
-            <a:ext cx="1262656" cy="152737"/>
+            <a:off x="7394379" y="471082"/>
+            <a:ext cx="1249832" cy="152737"/>
           </a:xfrm>
           <a:prstGeom prst="rect">
             <a:avLst/>
@@ -9442,10 +9523,10 @@
                 </a:solidFill>
                 <a:latin typeface="Source Sans Pro Light"/>
               </a:rPr>
-              <a:t>by Derek H. Ogle, </a:t>
-            </a:r>
-            <a:r>
-              <a:rPr lang="en-US" sz="600" b="1">
+              <a:t>by Derek H. Ogle, revised </a:t>
+            </a:r>
+            <a:r>
+              <a:rPr lang="en-US" sz="600" b="1" dirty="0" smtClean="0">
                 <a:solidFill>
                   <a:schemeClr val="bg1">
                     <a:lumMod val="75000"/>
@@ -9453,10 +9534,10 @@
                 </a:solidFill>
                 <a:latin typeface="Source Sans Pro Light"/>
               </a:rPr>
-              <a:t>revised </a:t>
-            </a:r>
-            <a:r>
-              <a:rPr lang="en-US" sz="600" b="1" smtClean="0">
+              <a:t>Oct</a:t>
+            </a:r>
+            <a:r>
+              <a:rPr lang="en-US" sz="600" b="1" dirty="0" smtClean="0">
                 <a:solidFill>
                   <a:schemeClr val="bg1">
                     <a:lumMod val="75000"/>
@@ -9464,7 +9545,7 @@
                 </a:solidFill>
                 <a:latin typeface="Source Sans Pro Light"/>
               </a:rPr>
-              <a:t>Sep-17</a:t>
+              <a:t>-17</a:t>
             </a:r>
             <a:endParaRPr lang="en-US" sz="600" b="1" dirty="0">
               <a:solidFill>
@@ -11826,6 +11907,16 @@
               <a:t>&gt; </a:t>
             </a:r>
             <a:r>
+              <a:rPr lang="en-US" sz="600" b="1" dirty="0" smtClean="0">
+                <a:solidFill>
+                  <a:srgbClr val="FF0000"/>
+                </a:solidFill>
+                <a:latin typeface="Courier New" panose="02070309020205020404" pitchFamily="49" charset="0"/>
+                <a:cs typeface="Courier New" panose="02070309020205020404" pitchFamily="49" charset="0"/>
+              </a:rPr>
+              <a:t>plot(</a:t>
+            </a:r>
+            <a:r>
               <a:rPr lang="en-US" sz="600" b="1" dirty="0" err="1" smtClean="0">
                 <a:solidFill>
                   <a:srgbClr val="FF0000"/>
@@ -11833,7 +11924,7 @@
                 <a:latin typeface="Courier New" panose="02070309020205020404" pitchFamily="49" charset="0"/>
                 <a:cs typeface="Courier New" panose="02070309020205020404" pitchFamily="49" charset="0"/>
               </a:rPr>
-              <a:t>corr</a:t>
+              <a:t>HMPG~Weight,data</a:t>
             </a:r>
             <a:r>
               <a:rPr lang="en-US" sz="600" b="1" dirty="0" smtClean="0">
@@ -11843,7 +11934,7 @@
                 <a:latin typeface="Courier New" panose="02070309020205020404" pitchFamily="49" charset="0"/>
                 <a:cs typeface="Courier New" panose="02070309020205020404" pitchFamily="49" charset="0"/>
               </a:rPr>
-              <a:t>(</a:t>
+              <a:t>=</a:t>
             </a:r>
             <a:r>
               <a:rPr lang="en-US" sz="600" b="1" dirty="0" err="1" smtClean="0">
@@ -11853,7 +11944,27 @@
                 <a:latin typeface="Courier New" panose="02070309020205020404" pitchFamily="49" charset="0"/>
                 <a:cs typeface="Courier New" panose="02070309020205020404" pitchFamily="49" charset="0"/>
               </a:rPr>
-              <a:t>HMPG~Weight,data</a:t>
+              <a:t>dfobj,xlab</a:t>
+            </a:r>
+            <a:r>
+              <a:rPr lang="en-US" sz="600" b="1" dirty="0">
+                <a:solidFill>
+                  <a:srgbClr val="FF0000"/>
+                </a:solidFill>
+                <a:latin typeface="Courier New" panose="02070309020205020404" pitchFamily="49" charset="0"/>
+                <a:cs typeface="Courier New" panose="02070309020205020404" pitchFamily="49" charset="0"/>
+              </a:rPr>
+              <a:t>="Weight (</a:t>
+            </a:r>
+            <a:r>
+              <a:rPr lang="en-US" sz="600" b="1" dirty="0" err="1">
+                <a:solidFill>
+                  <a:srgbClr val="FF0000"/>
+                </a:solidFill>
+                <a:latin typeface="Courier New" panose="02070309020205020404" pitchFamily="49" charset="0"/>
+                <a:cs typeface="Courier New" panose="02070309020205020404" pitchFamily="49" charset="0"/>
+              </a:rPr>
+              <a:t>lbs</a:t>
             </a:r>
             <a:r>
               <a:rPr lang="en-US" sz="600" b="1" dirty="0" smtClean="0">
@@ -11863,7 +11974,20 @@
                 <a:latin typeface="Courier New" panose="02070309020205020404" pitchFamily="49" charset="0"/>
                 <a:cs typeface="Courier New" panose="02070309020205020404" pitchFamily="49" charset="0"/>
               </a:rPr>
-              <a:t>=</a:t>
+              <a:t>)",</a:t>
+            </a:r>
+          </a:p>
+          <a:p>
+            <a:pPr algn="l" latinLnBrk="1"/>
+            <a:r>
+              <a:rPr lang="en-US" sz="600" b="1" dirty="0" smtClean="0">
+                <a:solidFill>
+                  <a:srgbClr val="FF0000"/>
+                </a:solidFill>
+                <a:latin typeface="Courier New" panose="02070309020205020404" pitchFamily="49" charset="0"/>
+                <a:cs typeface="Courier New" panose="02070309020205020404" pitchFamily="49" charset="0"/>
+              </a:rPr>
+              <a:t>       </a:t>
             </a:r>
             <a:r>
               <a:rPr lang="en-US" sz="600" b="1" dirty="0" err="1" smtClean="0">
@@ -11873,7 +11997,7 @@
                 <a:latin typeface="Courier New" panose="02070309020205020404" pitchFamily="49" charset="0"/>
                 <a:cs typeface="Courier New" panose="02070309020205020404" pitchFamily="49" charset="0"/>
               </a:rPr>
-              <a:t>dfobj</a:t>
+              <a:t>ylab</a:t>
             </a:r>
             <a:r>
               <a:rPr lang="en-US" sz="600" b="1" dirty="0">
@@ -11883,32 +12007,25 @@
                 <a:latin typeface="Courier New" panose="02070309020205020404" pitchFamily="49" charset="0"/>
                 <a:cs typeface="Courier New" panose="02070309020205020404" pitchFamily="49" charset="0"/>
               </a:rPr>
-              <a:t>)</a:t>
+              <a:t>="Highway MPG</a:t>
+            </a:r>
+            <a:r>
+              <a:rPr lang="en-US" sz="600" b="1" dirty="0" smtClean="0">
+                <a:solidFill>
+                  <a:srgbClr val="FF0000"/>
+                </a:solidFill>
+                <a:latin typeface="Courier New" panose="02070309020205020404" pitchFamily="49" charset="0"/>
+                <a:cs typeface="Courier New" panose="02070309020205020404" pitchFamily="49" charset="0"/>
+              </a:rPr>
+              <a:t>")</a:t>
             </a:r>
           </a:p>
           <a:p>
             <a:pPr algn="l" latinLnBrk="1"/>
-            <a:r>
-              <a:rPr lang="en-US" sz="600" dirty="0" smtClean="0">
-                <a:latin typeface="Courier New" panose="02070309020205020404" pitchFamily="49" charset="0"/>
-                <a:cs typeface="Courier New" panose="02070309020205020404" pitchFamily="49" charset="0"/>
-              </a:rPr>
-              <a:t>   </a:t>
-            </a:r>
-            <a:r>
-              <a:rPr lang="en-US" sz="600" dirty="0">
-                <a:latin typeface="Courier New" panose="02070309020205020404" pitchFamily="49" charset="0"/>
-                <a:cs typeface="Courier New" panose="02070309020205020404" pitchFamily="49" charset="0"/>
-              </a:rPr>
-              <a:t>[1] -</a:t>
-            </a:r>
-            <a:r>
-              <a:rPr lang="en-US" sz="600" dirty="0" smtClean="0">
-                <a:latin typeface="Courier New" panose="02070309020205020404" pitchFamily="49" charset="0"/>
-                <a:cs typeface="Courier New" panose="02070309020205020404" pitchFamily="49" charset="0"/>
-              </a:rPr>
-              <a:t>0.8106581</a:t>
-            </a:r>
+            <a:endParaRPr lang="en-US" sz="600" dirty="0" smtClean="0">
+              <a:latin typeface="Courier New" panose="02070309020205020404" pitchFamily="49" charset="0"/>
+              <a:cs typeface="Courier New" panose="02070309020205020404" pitchFamily="49" charset="0"/>
+            </a:endParaRPr>
           </a:p>
           <a:p>
             <a:pPr algn="l" latinLnBrk="1"/>
@@ -11919,126 +12036,17 @@
           </a:p>
           <a:p>
             <a:pPr algn="l" latinLnBrk="1"/>
-            <a:r>
-              <a:rPr lang="en-US" sz="600" dirty="0" smtClean="0">
-                <a:latin typeface="Courier New" panose="02070309020205020404" pitchFamily="49" charset="0"/>
-                <a:cs typeface="Courier New" panose="02070309020205020404" pitchFamily="49" charset="0"/>
-              </a:rPr>
-              <a:t>&gt; </a:t>
-            </a:r>
-            <a:r>
-              <a:rPr lang="en-US" sz="600" b="1" dirty="0" smtClean="0">
-                <a:solidFill>
-                  <a:srgbClr val="FF0000"/>
-                </a:solidFill>
-                <a:latin typeface="Courier New" panose="02070309020205020404" pitchFamily="49" charset="0"/>
-                <a:cs typeface="Courier New" panose="02070309020205020404" pitchFamily="49" charset="0"/>
-              </a:rPr>
-              <a:t>plot(</a:t>
-            </a:r>
-            <a:r>
-              <a:rPr lang="en-US" sz="600" b="1" dirty="0" err="1" smtClean="0">
-                <a:solidFill>
-                  <a:srgbClr val="FF0000"/>
-                </a:solidFill>
-                <a:latin typeface="Courier New" panose="02070309020205020404" pitchFamily="49" charset="0"/>
-                <a:cs typeface="Courier New" panose="02070309020205020404" pitchFamily="49" charset="0"/>
-              </a:rPr>
-              <a:t>HMPG~Weight,data</a:t>
-            </a:r>
-            <a:r>
-              <a:rPr lang="en-US" sz="600" b="1" dirty="0" smtClean="0">
-                <a:solidFill>
-                  <a:srgbClr val="FF0000"/>
-                </a:solidFill>
-                <a:latin typeface="Courier New" panose="02070309020205020404" pitchFamily="49" charset="0"/>
-                <a:cs typeface="Courier New" panose="02070309020205020404" pitchFamily="49" charset="0"/>
-              </a:rPr>
-              <a:t>=</a:t>
-            </a:r>
-            <a:r>
-              <a:rPr lang="en-US" sz="600" b="1" dirty="0" err="1" smtClean="0">
-                <a:solidFill>
-                  <a:srgbClr val="FF0000"/>
-                </a:solidFill>
-                <a:latin typeface="Courier New" panose="02070309020205020404" pitchFamily="49" charset="0"/>
-                <a:cs typeface="Courier New" panose="02070309020205020404" pitchFamily="49" charset="0"/>
-              </a:rPr>
-              <a:t>dfobj,xlab</a:t>
-            </a:r>
-            <a:r>
-              <a:rPr lang="en-US" sz="600" b="1" dirty="0">
-                <a:solidFill>
-                  <a:srgbClr val="FF0000"/>
-                </a:solidFill>
-                <a:latin typeface="Courier New" panose="02070309020205020404" pitchFamily="49" charset="0"/>
-                <a:cs typeface="Courier New" panose="02070309020205020404" pitchFamily="49" charset="0"/>
-              </a:rPr>
-              <a:t>="Weight (</a:t>
-            </a:r>
-            <a:r>
-              <a:rPr lang="en-US" sz="600" b="1" dirty="0" err="1">
-                <a:solidFill>
-                  <a:srgbClr val="FF0000"/>
-                </a:solidFill>
-                <a:latin typeface="Courier New" panose="02070309020205020404" pitchFamily="49" charset="0"/>
-                <a:cs typeface="Courier New" panose="02070309020205020404" pitchFamily="49" charset="0"/>
-              </a:rPr>
-              <a:t>lbs</a:t>
-            </a:r>
-            <a:r>
-              <a:rPr lang="en-US" sz="600" b="1" dirty="0" smtClean="0">
-                <a:solidFill>
-                  <a:srgbClr val="FF0000"/>
-                </a:solidFill>
-                <a:latin typeface="Courier New" panose="02070309020205020404" pitchFamily="49" charset="0"/>
-                <a:cs typeface="Courier New" panose="02070309020205020404" pitchFamily="49" charset="0"/>
-              </a:rPr>
-              <a:t>)",</a:t>
-            </a:r>
+            <a:endParaRPr lang="en-US" sz="600" dirty="0" smtClean="0">
+              <a:latin typeface="Courier New" panose="02070309020205020404" pitchFamily="49" charset="0"/>
+              <a:cs typeface="Courier New" panose="02070309020205020404" pitchFamily="49" charset="0"/>
+            </a:endParaRPr>
           </a:p>
           <a:p>
             <a:pPr algn="l" latinLnBrk="1"/>
-            <a:r>
-              <a:rPr lang="en-US" sz="600" b="1" dirty="0" smtClean="0">
-                <a:solidFill>
-                  <a:srgbClr val="FF0000"/>
-                </a:solidFill>
-                <a:latin typeface="Courier New" panose="02070309020205020404" pitchFamily="49" charset="0"/>
-                <a:cs typeface="Courier New" panose="02070309020205020404" pitchFamily="49" charset="0"/>
-              </a:rPr>
-              <a:t>       </a:t>
-            </a:r>
-            <a:r>
-              <a:rPr lang="en-US" sz="600" b="1" dirty="0" err="1" smtClean="0">
-                <a:solidFill>
-                  <a:srgbClr val="FF0000"/>
-                </a:solidFill>
-                <a:latin typeface="Courier New" panose="02070309020205020404" pitchFamily="49" charset="0"/>
-                <a:cs typeface="Courier New" panose="02070309020205020404" pitchFamily="49" charset="0"/>
-              </a:rPr>
-              <a:t>ylab</a:t>
-            </a:r>
-            <a:r>
-              <a:rPr lang="en-US" sz="600" b="1" dirty="0">
-                <a:solidFill>
-                  <a:srgbClr val="FF0000"/>
-                </a:solidFill>
-                <a:latin typeface="Courier New" panose="02070309020205020404" pitchFamily="49" charset="0"/>
-                <a:cs typeface="Courier New" panose="02070309020205020404" pitchFamily="49" charset="0"/>
-              </a:rPr>
-              <a:t>="Highway MPG</a:t>
-            </a:r>
-            <a:r>
-              <a:rPr lang="en-US" sz="600" b="1" dirty="0" smtClean="0">
-                <a:solidFill>
-                  <a:srgbClr val="FF0000"/>
-                </a:solidFill>
-                <a:latin typeface="Courier New" panose="02070309020205020404" pitchFamily="49" charset="0"/>
-                <a:cs typeface="Courier New" panose="02070309020205020404" pitchFamily="49" charset="0"/>
-              </a:rPr>
-              <a:t>")</a:t>
-            </a:r>
+            <a:endParaRPr lang="en-US" sz="600" dirty="0">
+              <a:latin typeface="Courier New" panose="02070309020205020404" pitchFamily="49" charset="0"/>
+              <a:cs typeface="Courier New" panose="02070309020205020404" pitchFamily="49" charset="0"/>
+            </a:endParaRPr>
           </a:p>
           <a:p>
             <a:pPr algn="l" latinLnBrk="1"/>
@@ -12077,7 +12085,7 @@
           </a:p>
           <a:p>
             <a:pPr algn="l" latinLnBrk="1"/>
-            <a:endParaRPr lang="en-US" sz="600" dirty="0">
+            <a:endParaRPr lang="en-US" sz="600" dirty="0" smtClean="0">
               <a:latin typeface="Courier New" panose="02070309020205020404" pitchFamily="49" charset="0"/>
               <a:cs typeface="Courier New" panose="02070309020205020404" pitchFamily="49" charset="0"/>
             </a:endParaRPr>
@@ -12091,31 +12099,83 @@
           </a:p>
           <a:p>
             <a:pPr algn="l" latinLnBrk="1"/>
-            <a:endParaRPr lang="en-US" sz="600" dirty="0">
-              <a:latin typeface="Courier New" panose="02070309020205020404" pitchFamily="49" charset="0"/>
-              <a:cs typeface="Courier New" panose="02070309020205020404" pitchFamily="49" charset="0"/>
-            </a:endParaRPr>
+            <a:r>
+              <a:rPr lang="en-US" sz="600" dirty="0">
+                <a:latin typeface="Courier New" panose="02070309020205020404" pitchFamily="49" charset="0"/>
+                <a:cs typeface="Courier New" panose="02070309020205020404" pitchFamily="49" charset="0"/>
+              </a:rPr>
+              <a:t>&gt; </a:t>
+            </a:r>
+            <a:r>
+              <a:rPr lang="en-US" sz="600" b="1" dirty="0" err="1">
+                <a:solidFill>
+                  <a:srgbClr val="FF0000"/>
+                </a:solidFill>
+                <a:latin typeface="Courier New" panose="02070309020205020404" pitchFamily="49" charset="0"/>
+                <a:cs typeface="Courier New" panose="02070309020205020404" pitchFamily="49" charset="0"/>
+              </a:rPr>
+              <a:t>corr</a:t>
+            </a:r>
+            <a:r>
+              <a:rPr lang="en-US" sz="600" b="1" dirty="0">
+                <a:solidFill>
+                  <a:srgbClr val="FF0000"/>
+                </a:solidFill>
+                <a:latin typeface="Courier New" panose="02070309020205020404" pitchFamily="49" charset="0"/>
+                <a:cs typeface="Courier New" panose="02070309020205020404" pitchFamily="49" charset="0"/>
+              </a:rPr>
+              <a:t>(</a:t>
+            </a:r>
+            <a:r>
+              <a:rPr lang="en-US" sz="600" b="1" dirty="0" err="1">
+                <a:solidFill>
+                  <a:srgbClr val="FF0000"/>
+                </a:solidFill>
+                <a:latin typeface="Courier New" panose="02070309020205020404" pitchFamily="49" charset="0"/>
+                <a:cs typeface="Courier New" panose="02070309020205020404" pitchFamily="49" charset="0"/>
+              </a:rPr>
+              <a:t>HMPG~Weight,data</a:t>
+            </a:r>
+            <a:r>
+              <a:rPr lang="en-US" sz="600" b="1" dirty="0">
+                <a:solidFill>
+                  <a:srgbClr val="FF0000"/>
+                </a:solidFill>
+                <a:latin typeface="Courier New" panose="02070309020205020404" pitchFamily="49" charset="0"/>
+                <a:cs typeface="Courier New" panose="02070309020205020404" pitchFamily="49" charset="0"/>
+              </a:rPr>
+              <a:t>=</a:t>
+            </a:r>
+            <a:r>
+              <a:rPr lang="en-US" sz="600" b="1" dirty="0" err="1">
+                <a:solidFill>
+                  <a:srgbClr val="FF0000"/>
+                </a:solidFill>
+                <a:latin typeface="Courier New" panose="02070309020205020404" pitchFamily="49" charset="0"/>
+                <a:cs typeface="Courier New" panose="02070309020205020404" pitchFamily="49" charset="0"/>
+              </a:rPr>
+              <a:t>dfobj</a:t>
+            </a:r>
+            <a:r>
+              <a:rPr lang="en-US" sz="600" b="1" dirty="0">
+                <a:solidFill>
+                  <a:srgbClr val="FF0000"/>
+                </a:solidFill>
+                <a:latin typeface="Courier New" panose="02070309020205020404" pitchFamily="49" charset="0"/>
+                <a:cs typeface="Courier New" panose="02070309020205020404" pitchFamily="49" charset="0"/>
+              </a:rPr>
+              <a:t>)</a:t>
+            </a:r>
           </a:p>
           <a:p>
             <a:pPr algn="l" latinLnBrk="1"/>
-            <a:endParaRPr lang="en-US" sz="600" dirty="0" smtClean="0">
-              <a:latin typeface="Courier New" panose="02070309020205020404" pitchFamily="49" charset="0"/>
-              <a:cs typeface="Courier New" panose="02070309020205020404" pitchFamily="49" charset="0"/>
-            </a:endParaRPr>
-          </a:p>
-          <a:p>
-            <a:pPr algn="l" latinLnBrk="1"/>
-            <a:endParaRPr lang="en-US" sz="600" dirty="0" smtClean="0">
-              <a:latin typeface="Courier New" panose="02070309020205020404" pitchFamily="49" charset="0"/>
-              <a:cs typeface="Courier New" panose="02070309020205020404" pitchFamily="49" charset="0"/>
-            </a:endParaRPr>
-          </a:p>
-          <a:p>
-            <a:pPr algn="l" latinLnBrk="1"/>
-            <a:endParaRPr lang="en-US" sz="600" dirty="0" smtClean="0">
-              <a:latin typeface="Courier New" panose="02070309020205020404" pitchFamily="49" charset="0"/>
-              <a:cs typeface="Courier New" panose="02070309020205020404" pitchFamily="49" charset="0"/>
-            </a:endParaRPr>
+            <a:r>
+              <a:rPr lang="en-US" sz="600" dirty="0">
+                <a:latin typeface="Courier New" panose="02070309020205020404" pitchFamily="49" charset="0"/>
+                <a:cs typeface="Courier New" panose="02070309020205020404" pitchFamily="49" charset="0"/>
+              </a:rPr>
+              <a:t>   [1] -0.8106581</a:t>
+            </a:r>
           </a:p>
           <a:p>
             <a:pPr algn="l" latinLnBrk="1"/>
@@ -14874,7 +14934,7 @@
         </p:blipFill>
         <p:spPr bwMode="auto">
           <a:xfrm>
-            <a:off x="3313437" y="838748"/>
+            <a:off x="3314357" y="534388"/>
             <a:ext cx="1143000" cy="914400"/>
           </a:xfrm>
           <a:prstGeom prst="rect">
@@ -14915,7 +14975,7 @@
           </a:ln>
           <a:extLst>
             <a:ext uri="{C572A759-6A51-4108-AA02-DFA0A04FC94B}">
-              <ma14:wrappingTextBoxFlag xmlns="" xmlns:ma14="http://schemas.microsoft.com/office/mac/drawingml/2011/main" val="1"/>
+              <ma14:wrappingTextBoxFlag xmlns:ma14="http://schemas.microsoft.com/office/mac/drawingml/2011/main" xmlns="" val="1"/>
             </a:ext>
           </a:extLst>
         </p:spPr>
@@ -14981,7 +15041,7 @@
           </a:ln>
           <a:extLst>
             <a:ext uri="{C572A759-6A51-4108-AA02-DFA0A04FC94B}">
-              <ma14:wrappingTextBoxFlag xmlns="" xmlns:ma14="http://schemas.microsoft.com/office/mac/drawingml/2011/main" val="1"/>
+              <ma14:wrappingTextBoxFlag xmlns:ma14="http://schemas.microsoft.com/office/mac/drawingml/2011/main" xmlns="" val="1"/>
             </a:ext>
           </a:extLst>
         </p:spPr>
@@ -15047,7 +15107,7 @@
           </a:ln>
           <a:extLst>
             <a:ext uri="{C572A759-6A51-4108-AA02-DFA0A04FC94B}">
-              <ma14:wrappingTextBoxFlag xmlns="" xmlns:ma14="http://schemas.microsoft.com/office/mac/drawingml/2011/main" val="1"/>
+              <ma14:wrappingTextBoxFlag xmlns:ma14="http://schemas.microsoft.com/office/mac/drawingml/2011/main" xmlns="" val="1"/>
             </a:ext>
           </a:extLst>
         </p:spPr>
@@ -15113,7 +15173,7 @@
           </a:ln>
           <a:extLst>
             <a:ext uri="{C572A759-6A51-4108-AA02-DFA0A04FC94B}">
-              <ma14:wrappingTextBoxFlag xmlns="" xmlns:ma14="http://schemas.microsoft.com/office/mac/drawingml/2011/main" val="1"/>
+              <ma14:wrappingTextBoxFlag xmlns:ma14="http://schemas.microsoft.com/office/mac/drawingml/2011/main" xmlns="" val="1"/>
             </a:ext>
           </a:extLst>
         </p:spPr>
@@ -15203,7 +15263,7 @@
           </a:ln>
           <a:extLst>
             <a:ext uri="{C572A759-6A51-4108-AA02-DFA0A04FC94B}">
-              <ma14:wrappingTextBoxFlag xmlns="" xmlns:ma14="http://schemas.microsoft.com/office/mac/drawingml/2011/main" val="1"/>
+              <ma14:wrappingTextBoxFlag xmlns:ma14="http://schemas.microsoft.com/office/mac/drawingml/2011/main" xmlns="" val="1"/>
             </a:ext>
           </a:extLst>
         </p:spPr>

</xml_diff>